<commit_message>
Final ggplot2 part 2
</commit_message>
<xml_diff>
--- a/notes/ggplot2_part2.pptx
+++ b/notes/ggplot2_part2.pptx
@@ -129,6 +129,22 @@
       </a:defRPr>
     </a:lvl9pPr>
   </p:defaultTextStyle>
+  <p:extLst>
+    <p:ext uri="{EFAFB233-063F-42B5-8137-9DF3F51BA10A}">
+      <p15:sldGuideLst xmlns:p15="http://schemas.microsoft.com/office/powerpoint/2012/main">
+        <p15:guide id="1" orient="horz" pos="1620">
+          <p15:clr>
+            <a:srgbClr val="A4A3A4"/>
+          </p15:clr>
+        </p15:guide>
+        <p15:guide id="2" pos="2880">
+          <p15:clr>
+            <a:srgbClr val="A4A3A4"/>
+          </p15:clr>
+        </p15:guide>
+      </p15:sldGuideLst>
+    </p:ext>
+  </p:extLst>
 </p:presentation>
 </file>
 
@@ -213,7 +229,7 @@
           </a:lstStyle>
           <a:p>
             <a:fld id="{1A9178C0-C8D5-6C48-889B-4D3D500BFD3A}" type="datetimeFigureOut">
-              <a:t>9/30/13</a:t>
+              <a:t>9/22/16</a:t>
             </a:fld>
             <a:endParaRPr lang="en-US"/>
           </a:p>
@@ -2420,7 +2436,7 @@
           <a:lstStyle/>
           <a:p>
             <a:fld id="{F0043A7B-3319-A040-A0BD-5F8BB7DD86A6}" type="datetimeFigureOut">
-              <a:t>9/30/13</a:t>
+              <a:t>9/22/16</a:t>
             </a:fld>
             <a:endParaRPr lang="en-US"/>
           </a:p>
@@ -2586,7 +2602,7 @@
           <a:lstStyle/>
           <a:p>
             <a:fld id="{F0043A7B-3319-A040-A0BD-5F8BB7DD86A6}" type="datetimeFigureOut">
-              <a:t>9/30/13</a:t>
+              <a:t>9/22/16</a:t>
             </a:fld>
             <a:endParaRPr lang="en-US"/>
           </a:p>
@@ -2762,7 +2778,7 @@
           <a:lstStyle/>
           <a:p>
             <a:fld id="{F0043A7B-3319-A040-A0BD-5F8BB7DD86A6}" type="datetimeFigureOut">
-              <a:t>9/30/13</a:t>
+              <a:t>9/22/16</a:t>
             </a:fld>
             <a:endParaRPr lang="en-US"/>
           </a:p>
@@ -2928,7 +2944,7 @@
           <a:lstStyle/>
           <a:p>
             <a:fld id="{F0043A7B-3319-A040-A0BD-5F8BB7DD86A6}" type="datetimeFigureOut">
-              <a:t>9/30/13</a:t>
+              <a:t>9/22/16</a:t>
             </a:fld>
             <a:endParaRPr lang="en-US"/>
           </a:p>
@@ -3171,7 +3187,7 @@
           <a:lstStyle/>
           <a:p>
             <a:fld id="{F0043A7B-3319-A040-A0BD-5F8BB7DD86A6}" type="datetimeFigureOut">
-              <a:t>9/30/13</a:t>
+              <a:t>9/22/16</a:t>
             </a:fld>
             <a:endParaRPr lang="en-US"/>
           </a:p>
@@ -3454,7 +3470,7 @@
           <a:lstStyle/>
           <a:p>
             <a:fld id="{F0043A7B-3319-A040-A0BD-5F8BB7DD86A6}" type="datetimeFigureOut">
-              <a:t>9/30/13</a:t>
+              <a:t>9/22/16</a:t>
             </a:fld>
             <a:endParaRPr lang="en-US"/>
           </a:p>
@@ -3876,7 +3892,7 @@
           <a:lstStyle/>
           <a:p>
             <a:fld id="{F0043A7B-3319-A040-A0BD-5F8BB7DD86A6}" type="datetimeFigureOut">
-              <a:t>9/30/13</a:t>
+              <a:t>9/22/16</a:t>
             </a:fld>
             <a:endParaRPr lang="en-US"/>
           </a:p>
@@ -3991,7 +4007,7 @@
           <a:lstStyle/>
           <a:p>
             <a:fld id="{F0043A7B-3319-A040-A0BD-5F8BB7DD86A6}" type="datetimeFigureOut">
-              <a:t>9/30/13</a:t>
+              <a:t>9/22/16</a:t>
             </a:fld>
             <a:endParaRPr lang="en-US"/>
           </a:p>
@@ -4084,7 +4100,7 @@
           <a:lstStyle/>
           <a:p>
             <a:fld id="{F0043A7B-3319-A040-A0BD-5F8BB7DD86A6}" type="datetimeFigureOut">
-              <a:t>9/30/13</a:t>
+              <a:t>9/22/16</a:t>
             </a:fld>
             <a:endParaRPr lang="en-US"/>
           </a:p>
@@ -4357,7 +4373,7 @@
           <a:lstStyle/>
           <a:p>
             <a:fld id="{F0043A7B-3319-A040-A0BD-5F8BB7DD86A6}" type="datetimeFigureOut">
-              <a:t>9/30/13</a:t>
+              <a:t>9/22/16</a:t>
             </a:fld>
             <a:endParaRPr lang="en-US"/>
           </a:p>
@@ -4607,7 +4623,7 @@
           <a:lstStyle/>
           <a:p>
             <a:fld id="{F0043A7B-3319-A040-A0BD-5F8BB7DD86A6}" type="datetimeFigureOut">
-              <a:t>9/30/13</a:t>
+              <a:t>9/22/16</a:t>
             </a:fld>
             <a:endParaRPr lang="en-US"/>
           </a:p>
@@ -4816,7 +4832,7 @@
           </a:lstStyle>
           <a:p>
             <a:fld id="{F0043A7B-3319-A040-A0BD-5F8BB7DD86A6}" type="datetimeFigureOut">
-              <a:t>9/30/13</a:t>
+              <a:t>9/22/16</a:t>
             </a:fld>
             <a:endParaRPr lang="en-US"/>
           </a:p>
@@ -5247,7 +5263,7 @@
   <p:timing>
     <p:tnLst>
       <p:par>
-        <p:cTn xmlns:p14="http://schemas.microsoft.com/office/powerpoint/2010/main" id="1" dur="indefinite" restart="never" nodeType="tmRoot"/>
+        <p:cTn id="1" dur="indefinite" restart="never" nodeType="tmRoot"/>
       </p:par>
     </p:tnLst>
   </p:timing>
@@ -5432,7 +5448,7 @@
   <p:timing>
     <p:tnLst>
       <p:par>
-        <p:cTn xmlns:p14="http://schemas.microsoft.com/office/powerpoint/2010/main" id="1" dur="indefinite" restart="never" nodeType="tmRoot"/>
+        <p:cTn id="1" dur="indefinite" restart="never" nodeType="tmRoot"/>
       </p:par>
     </p:tnLst>
   </p:timing>
@@ -5778,7 +5794,7 @@
   <p:timing>
     <p:tnLst>
       <p:par>
-        <p:cTn xmlns:p14="http://schemas.microsoft.com/office/powerpoint/2010/main" id="1" dur="indefinite" restart="never" nodeType="tmRoot"/>
+        <p:cTn id="1" dur="indefinite" restart="never" nodeType="tmRoot"/>
       </p:par>
     </p:tnLst>
   </p:timing>
@@ -5909,7 +5925,7 @@
   <p:timing>
     <p:tnLst>
       <p:par>
-        <p:cTn xmlns:p14="http://schemas.microsoft.com/office/powerpoint/2010/main" id="1" dur="indefinite" restart="never" nodeType="tmRoot"/>
+        <p:cTn id="1" dur="indefinite" restart="never" nodeType="tmRoot"/>
       </p:par>
     </p:tnLst>
   </p:timing>
@@ -6244,7 +6260,7 @@
   <p:timing>
     <p:tnLst>
       <p:par>
-        <p:cTn xmlns:p14="http://schemas.microsoft.com/office/powerpoint/2010/main" id="1" dur="indefinite" restart="never" nodeType="tmRoot"/>
+        <p:cTn id="1" dur="indefinite" restart="never" nodeType="tmRoot"/>
       </p:par>
     </p:tnLst>
   </p:timing>
@@ -6441,7 +6457,7 @@
   <p:timing>
     <p:tnLst>
       <p:par>
-        <p:cTn xmlns:p14="http://schemas.microsoft.com/office/powerpoint/2010/main" id="1" dur="indefinite" restart="never" nodeType="tmRoot"/>
+        <p:cTn id="1" dur="indefinite" restart="never" nodeType="tmRoot"/>
       </p:par>
     </p:tnLst>
   </p:timing>
@@ -6673,7 +6689,7 @@
   <p:timing>
     <p:tnLst>
       <p:par>
-        <p:cTn xmlns:p14="http://schemas.microsoft.com/office/powerpoint/2010/main" id="1" dur="indefinite" restart="never" nodeType="tmRoot"/>
+        <p:cTn id="1" dur="indefinite" restart="never" nodeType="tmRoot"/>
       </p:par>
     </p:tnLst>
   </p:timing>
@@ -6794,7 +6810,7 @@
   <p:timing>
     <p:tnLst>
       <p:par>
-        <p:cTn xmlns:p14="http://schemas.microsoft.com/office/powerpoint/2010/main" id="1" dur="indefinite" restart="never" nodeType="tmRoot"/>
+        <p:cTn id="1" dur="indefinite" restart="never" nodeType="tmRoot"/>
       </p:par>
     </p:tnLst>
   </p:timing>
@@ -7007,7 +7023,7 @@
   <p:timing>
     <p:tnLst>
       <p:par>
-        <p:cTn xmlns:p14="http://schemas.microsoft.com/office/powerpoint/2010/main" id="1" dur="indefinite" restart="never" nodeType="tmRoot"/>
+        <p:cTn id="1" dur="indefinite" restart="never" nodeType="tmRoot"/>
       </p:par>
     </p:tnLst>
   </p:timing>
@@ -7345,7 +7361,7 @@
   <p:timing>
     <p:tnLst>
       <p:par>
-        <p:cTn xmlns:p14="http://schemas.microsoft.com/office/powerpoint/2010/main" id="1" dur="indefinite" restart="never" nodeType="tmRoot"/>
+        <p:cTn id="1" dur="indefinite" restart="never" nodeType="tmRoot"/>
       </p:par>
     </p:tnLst>
   </p:timing>
@@ -7474,7 +7490,7 @@
   <p:timing>
     <p:tnLst>
       <p:par>
-        <p:cTn xmlns:p14="http://schemas.microsoft.com/office/powerpoint/2010/main" id="1" dur="indefinite" restart="never" nodeType="tmRoot"/>
+        <p:cTn id="1" dur="indefinite" restart="never" nodeType="tmRoot"/>
       </p:par>
     </p:tnLst>
   </p:timing>
@@ -7583,7 +7599,7 @@
   <p:timing>
     <p:tnLst>
       <p:par>
-        <p:cTn xmlns:p14="http://schemas.microsoft.com/office/powerpoint/2010/main" id="1" dur="indefinite" restart="never" nodeType="tmRoot"/>
+        <p:cTn id="1" dur="indefinite" restart="never" nodeType="tmRoot"/>
       </p:par>
     </p:tnLst>
   </p:timing>
@@ -7752,7 +7768,7 @@
   <p:timing>
     <p:tnLst>
       <p:par>
-        <p:cTn xmlns:p14="http://schemas.microsoft.com/office/powerpoint/2010/main" id="1" dur="indefinite" restart="never" nodeType="tmRoot"/>
+        <p:cTn id="1" dur="indefinite" restart="never" nodeType="tmRoot"/>
       </p:par>
     </p:tnLst>
   </p:timing>
@@ -8256,7 +8272,7 @@
   <p:timing>
     <p:tnLst>
       <p:par>
-        <p:cTn xmlns:p14="http://schemas.microsoft.com/office/powerpoint/2010/main" id="1" dur="indefinite" restart="never" nodeType="tmRoot">
+        <p:cTn id="1" dur="indefinite" restart="never" nodeType="tmRoot">
           <p:childTnLst>
             <p:seq concurrent="1" nextAc="seek">
               <p:cTn id="2" dur="indefinite" nodeType="mainSeq">
@@ -9231,7 +9247,7 @@
   <p:timing>
     <p:tnLst>
       <p:par>
-        <p:cTn xmlns:p14="http://schemas.microsoft.com/office/powerpoint/2010/main" id="1" dur="indefinite" restart="never" nodeType="tmRoot"/>
+        <p:cTn id="1" dur="indefinite" restart="never" nodeType="tmRoot"/>
       </p:par>
     </p:tnLst>
   </p:timing>
@@ -9320,7 +9336,7 @@
   <p:timing>
     <p:tnLst>
       <p:par>
-        <p:cTn xmlns:p14="http://schemas.microsoft.com/office/powerpoint/2010/main" id="1" dur="indefinite" restart="never" nodeType="tmRoot"/>
+        <p:cTn id="1" dur="indefinite" restart="never" nodeType="tmRoot"/>
       </p:par>
     </p:tnLst>
   </p:timing>
@@ -9498,7 +9514,7 @@
   <p:timing>
     <p:tnLst>
       <p:par>
-        <p:cTn xmlns:p14="http://schemas.microsoft.com/office/powerpoint/2010/main" id="1" dur="indefinite" restart="never" nodeType="tmRoot"/>
+        <p:cTn id="1" dur="indefinite" restart="never" nodeType="tmRoot"/>
       </p:par>
     </p:tnLst>
   </p:timing>
@@ -9608,7 +9624,7 @@
   <p:timing>
     <p:tnLst>
       <p:par>
-        <p:cTn xmlns:p14="http://schemas.microsoft.com/office/powerpoint/2010/main" id="1" dur="indefinite" restart="never" nodeType="tmRoot"/>
+        <p:cTn id="1" dur="indefinite" restart="never" nodeType="tmRoot"/>
       </p:par>
     </p:tnLst>
   </p:timing>
@@ -9723,7 +9739,7 @@
   <p:timing>
     <p:tnLst>
       <p:par>
-        <p:cTn xmlns:p14="http://schemas.microsoft.com/office/powerpoint/2010/main" id="1" dur="indefinite" restart="never" nodeType="tmRoot"/>
+        <p:cTn id="1" dur="indefinite" restart="never" nodeType="tmRoot"/>
       </p:par>
     </p:tnLst>
   </p:timing>
@@ -9792,11 +9808,109 @@
           <a:lstStyle/>
           <a:p>
             <a:r>
+              <a:rPr lang="en-US" sz="1400" dirty="0" err="1">
+                <a:latin typeface="Courier"/>
+                <a:cs typeface="Courier"/>
+              </a:rPr>
+              <a:t>qplot</a:t>
+            </a:r>
+            <a:r>
+              <a:rPr lang="en-US" sz="1400" dirty="0">
+                <a:latin typeface="Courier"/>
+                <a:cs typeface="Courier"/>
+              </a:rPr>
+              <a:t>(logpm25, </a:t>
+            </a:r>
+            <a:r>
+              <a:rPr lang="en-US" sz="1400" dirty="0" err="1">
+                <a:latin typeface="Courier"/>
+                <a:cs typeface="Courier"/>
+              </a:rPr>
+              <a:t>NocturnalSympt</a:t>
+            </a:r>
+            <a:r>
+              <a:rPr lang="en-US" sz="1400" dirty="0">
+                <a:latin typeface="Courier"/>
+                <a:cs typeface="Courier"/>
+              </a:rPr>
+              <a:t>, data = </a:t>
+            </a:r>
+            <a:r>
+              <a:rPr lang="en-US" sz="1400" dirty="0" err="1">
+                <a:latin typeface="Courier"/>
+                <a:cs typeface="Courier"/>
+              </a:rPr>
+              <a:t>maacs</a:t>
+            </a:r>
+            <a:r>
+              <a:rPr lang="en-US" sz="1400" dirty="0">
+                <a:latin typeface="Courier"/>
+                <a:cs typeface="Courier"/>
+              </a:rPr>
+              <a:t>, facets = . ~ </a:t>
+            </a:r>
+            <a:r>
+              <a:rPr lang="en-US" sz="1400" dirty="0" err="1" smtClean="0">
+                <a:latin typeface="Courier"/>
+                <a:cs typeface="Courier"/>
+              </a:rPr>
+              <a:t>bmicat</a:t>
+            </a:r>
+            <a:r>
+              <a:rPr lang="en-US" sz="1400" dirty="0" smtClean="0">
+                <a:latin typeface="Courier"/>
+                <a:cs typeface="Courier"/>
+              </a:rPr>
+              <a:t>) + </a:t>
+            </a:r>
+            <a:r>
+              <a:rPr lang="en-US" sz="1400" dirty="0" err="1" smtClean="0">
+                <a:latin typeface="Courier"/>
+                <a:cs typeface="Courier"/>
+              </a:rPr>
+              <a:t>geom</a:t>
+            </a:r>
+            <a:r>
+              <a:rPr lang="en-US" sz="1400" dirty="0" err="1" smtClean="0">
+                <a:latin typeface="Courier"/>
+                <a:cs typeface="Courier"/>
+              </a:rPr>
+              <a:t>_</a:t>
+            </a:r>
+            <a:r>
+              <a:rPr lang="en-US" sz="1400" dirty="0" err="1" smtClean="0">
+                <a:latin typeface="Courier"/>
+                <a:cs typeface="Courier"/>
+              </a:rPr>
+              <a:t>smooth</a:t>
+            </a:r>
+            <a:r>
+              <a:rPr lang="en-US" sz="1400" smtClean="0">
+                <a:latin typeface="Courier"/>
+                <a:cs typeface="Courier"/>
+              </a:rPr>
+              <a:t>(method </a:t>
+            </a:r>
+            <a:r>
               <a:rPr lang="en-US" sz="1400">
                 <a:latin typeface="Courier"/>
                 <a:cs typeface="Courier"/>
               </a:rPr>
-              <a:t>qplot(logpm25, NocturnalSympt, data = maacs, facets = . ~ bmicat, geom = c("point", "smooth"), method = "lm”)</a:t>
+              <a:t>= </a:t>
+            </a:r>
+            <a:r>
+              <a:rPr lang="en-US" sz="1400" smtClean="0">
+                <a:latin typeface="Courier"/>
+                <a:cs typeface="Courier"/>
+              </a:rPr>
+              <a:t>“lm</a:t>
+            </a:r>
+            <a:r>
+              <a:rPr lang="en-US" sz="1400" dirty="0">
+                <a:latin typeface="Courier"/>
+                <a:cs typeface="Courier"/>
+              </a:rPr>
+              <a:t>”)</a:t>
             </a:r>
           </a:p>
         </p:txBody>
@@ -9844,7 +9958,7 @@
   <p:timing>
     <p:tnLst>
       <p:par>
-        <p:cTn xmlns:p14="http://schemas.microsoft.com/office/powerpoint/2010/main" id="1" dur="indefinite" restart="never" nodeType="tmRoot"/>
+        <p:cTn id="1" dur="indefinite" restart="never" nodeType="tmRoot"/>
       </p:par>
     </p:tnLst>
   </p:timing>
@@ -10376,7 +10490,7 @@
   <p:timing>
     <p:tnLst>
       <p:par>
-        <p:cTn xmlns:p14="http://schemas.microsoft.com/office/powerpoint/2010/main" id="1" dur="indefinite" restart="never" nodeType="tmRoot"/>
+        <p:cTn id="1" dur="indefinite" restart="never" nodeType="tmRoot"/>
       </p:par>
     </p:tnLst>
   </p:timing>
@@ -10675,7 +10789,7 @@
   <p:timing>
     <p:tnLst>
       <p:par>
-        <p:cTn xmlns:p14="http://schemas.microsoft.com/office/powerpoint/2010/main" id="1" dur="indefinite" restart="never" nodeType="tmRoot"/>
+        <p:cTn id="1" dur="indefinite" restart="never" nodeType="tmRoot"/>
       </p:par>
     </p:tnLst>
   </p:timing>
@@ -10805,7 +10919,7 @@
   <p:timing>
     <p:tnLst>
       <p:par>
-        <p:cTn xmlns:p14="http://schemas.microsoft.com/office/powerpoint/2010/main" id="1" dur="indefinite" restart="never" nodeType="tmRoot"/>
+        <p:cTn id="1" dur="indefinite" restart="never" nodeType="tmRoot"/>
       </p:par>
     </p:tnLst>
   </p:timing>

</xml_diff>